<commit_message>
completed presentation for this coming week
</commit_message>
<xml_diff>
--- a/Intro to Web Development Part 4 CSS Layouts.pptx
+++ b/Intro to Web Development Part 4 CSS Layouts.pptx
@@ -5,15 +5,21 @@
     <p:sldMasterId id="2147483828" r:id="rId1"/>
   </p:sldMasterIdLst>
   <p:notesMasterIdLst>
-    <p:notesMasterId r:id="rId5"/>
+    <p:notesMasterId r:id="rId11"/>
   </p:notesMasterIdLst>
   <p:handoutMasterIdLst>
-    <p:handoutMasterId r:id="rId6"/>
+    <p:handoutMasterId r:id="rId12"/>
   </p:handoutMasterIdLst>
   <p:sldIdLst>
     <p:sldId id="256" r:id="rId2"/>
     <p:sldId id="283" r:id="rId3"/>
-    <p:sldId id="282" r:id="rId4"/>
+    <p:sldId id="284" r:id="rId4"/>
+    <p:sldId id="285" r:id="rId5"/>
+    <p:sldId id="286" r:id="rId6"/>
+    <p:sldId id="287" r:id="rId7"/>
+    <p:sldId id="289" r:id="rId8"/>
+    <p:sldId id="288" r:id="rId9"/>
+    <p:sldId id="282" r:id="rId10"/>
   </p:sldIdLst>
   <p:sldSz cx="9144000" cy="6858000" type="screen4x3"/>
   <p:notesSz cx="6858000" cy="9144000"/>
@@ -198,7 +204,7 @@
             <a:fld id="{D1D57645-FFCD-449A-BB23-5EA1509828F4}" type="datetimeFigureOut">
               <a:rPr lang="en-US" smtClean="0"/>
               <a:pPr/>
-              <a:t>7/5/2012</a:t>
+              <a:t>7/7/2012</a:t>
             </a:fld>
             <a:endParaRPr lang="en-US"/>
           </a:p>
@@ -360,7 +366,7 @@
             <a:fld id="{3DBF5F01-9883-438B-B6D0-73DBD5B9823F}" type="datetimeFigureOut">
               <a:rPr lang="en-US" smtClean="0"/>
               <a:pPr/>
-              <a:t>7/5/2012</a:t>
+              <a:t>7/7/2012</a:t>
             </a:fld>
             <a:endParaRPr lang="en-US"/>
           </a:p>
@@ -761,7 +767,7 @@
             <a:fld id="{A57BAD35-6B84-4191-B3DC-7A403A6A0CC3}" type="datetime1">
               <a:rPr lang="en-US" smtClean="0"/>
               <a:pPr/>
-              <a:t>7/5/2012</a:t>
+              <a:t>7/7/2012</a:t>
             </a:fld>
             <a:endParaRPr lang="en-US"/>
           </a:p>
@@ -1076,7 +1082,7 @@
             <a:fld id="{3A050941-FA83-4211-A590-AC0CE56A8764}" type="datetime1">
               <a:rPr lang="en-US" smtClean="0"/>
               <a:pPr/>
-              <a:t>7/5/2012</a:t>
+              <a:t>7/7/2012</a:t>
             </a:fld>
             <a:endParaRPr lang="en-US"/>
           </a:p>
@@ -1263,7 +1269,7 @@
             <a:fld id="{FEE52DFA-80C0-47DB-9BD9-1D65CB6CDA24}" type="datetime1">
               <a:rPr lang="en-US" smtClean="0"/>
               <a:pPr/>
-              <a:t>7/5/2012</a:t>
+              <a:t>7/7/2012</a:t>
             </a:fld>
             <a:endParaRPr lang="en-US"/>
           </a:p>
@@ -1440,7 +1446,7 @@
             <a:fld id="{C2F50358-D16D-4C1E-B4FA-5684242D23EC}" type="datetime1">
               <a:rPr lang="en-US" smtClean="0"/>
               <a:pPr/>
-              <a:t>7/5/2012</a:t>
+              <a:t>7/7/2012</a:t>
             </a:fld>
             <a:endParaRPr lang="en-US"/>
           </a:p>
@@ -1710,7 +1716,7 @@
             <a:fld id="{CBDDB5AB-3AEE-44CE-9007-9F1799B280DC}" type="datetime1">
               <a:rPr lang="en-US" smtClean="0"/>
               <a:pPr/>
-              <a:t>7/5/2012</a:t>
+              <a:t>7/7/2012</a:t>
             </a:fld>
             <a:endParaRPr lang="en-US"/>
           </a:p>
@@ -2180,7 +2186,7 @@
             <a:fld id="{D3203901-A8D7-4787-8A59-7548459B0167}" type="datetime1">
               <a:rPr lang="en-US" smtClean="0"/>
               <a:pPr/>
-              <a:t>7/5/2012</a:t>
+              <a:t>7/7/2012</a:t>
             </a:fld>
             <a:endParaRPr lang="en-US"/>
           </a:p>
@@ -2671,7 +2677,7 @@
             <a:fld id="{7918E94E-D541-420D-A800-FD77FBF7DA22}" type="datetime1">
               <a:rPr lang="en-US" smtClean="0"/>
               <a:pPr/>
-              <a:t>7/5/2012</a:t>
+              <a:t>7/7/2012</a:t>
             </a:fld>
             <a:endParaRPr lang="en-US"/>
           </a:p>
@@ -2799,7 +2805,7 @@
             <a:fld id="{4F6AD9DB-6294-4080-B799-E3AAD55EC433}" type="datetime1">
               <a:rPr lang="en-US" smtClean="0"/>
               <a:pPr/>
-              <a:t>7/5/2012</a:t>
+              <a:t>7/7/2012</a:t>
             </a:fld>
             <a:endParaRPr lang="en-US"/>
           </a:p>
@@ -2945,7 +2951,7 @@
             <a:fld id="{BB50B515-1A03-4B7B-9677-075026F277E2}" type="datetime1">
               <a:rPr lang="en-US" smtClean="0"/>
               <a:pPr/>
-              <a:t>7/5/2012</a:t>
+              <a:t>7/7/2012</a:t>
             </a:fld>
             <a:endParaRPr lang="en-US"/>
           </a:p>
@@ -3269,7 +3275,7 @@
             <a:fld id="{BB176034-9467-42CE-BFB4-763887316EF3}" type="datetime1">
               <a:rPr lang="en-US" smtClean="0"/>
               <a:pPr/>
-              <a:t>7/5/2012</a:t>
+              <a:t>7/7/2012</a:t>
             </a:fld>
             <a:endParaRPr lang="en-US"/>
           </a:p>
@@ -3405,7 +3411,7 @@
             <a:fld id="{49E44895-E262-425D-912F-9A1492637C2E}" type="datetime1">
               <a:rPr lang="en-US" smtClean="0"/>
               <a:pPr/>
-              <a:t>7/5/2012</a:t>
+              <a:t>7/7/2012</a:t>
             </a:fld>
             <a:endParaRPr lang="en-US"/>
           </a:p>
@@ -4188,7 +4194,7 @@
             <a:fld id="{23F403FB-53A5-4106-8144-8A9C4E2CDCDB}" type="datetime1">
               <a:rPr lang="en-US" smtClean="0"/>
               <a:pPr/>
-              <a:t>7/5/2012</a:t>
+              <a:t>7/7/2012</a:t>
             </a:fld>
             <a:endParaRPr lang="en-US"/>
           </a:p>
@@ -4721,15 +4727,7 @@
           <a:p>
             <a:r>
               <a:rPr lang="en-US" dirty="0" smtClean="0"/>
-              <a:t>Cascading Style </a:t>
-            </a:r>
-            <a:r>
-              <a:rPr lang="en-US" dirty="0" smtClean="0"/>
-              <a:t>Sheets fo</a:t>
-            </a:r>
-            <a:r>
-              <a:rPr lang="en-US" dirty="0" smtClean="0"/>
-              <a:t>r designing Layouts</a:t>
+              <a:t>Cascading Style Sheets for designing Layouts</a:t>
             </a:r>
             <a:endParaRPr lang="en-US" dirty="0"/>
           </a:p>
@@ -4977,14 +4975,742 @@
         </p:nvSpPr>
         <p:spPr/>
         <p:txBody>
+          <a:bodyPr/>
+          <a:lstStyle/>
+          <a:p>
+            <a:r>
+              <a:rPr lang="en-US" dirty="0" smtClean="0"/>
+              <a:t>Layouts</a:t>
+            </a:r>
+            <a:endParaRPr lang="en-US" dirty="0"/>
+          </a:p>
+        </p:txBody>
+      </p:sp>
+      <p:sp>
+        <p:nvSpPr>
+          <p:cNvPr id="4" name="Slide Number Placeholder 3"/>
+          <p:cNvSpPr>
+            <a:spLocks noGrp="1"/>
+          </p:cNvSpPr>
+          <p:nvPr>
+            <p:ph type="sldNum" sz="quarter" idx="12"/>
+          </p:nvPr>
+        </p:nvSpPr>
+        <p:spPr/>
+        <p:txBody>
+          <a:bodyPr/>
+          <a:lstStyle/>
+          <a:p>
+            <a:fld id="{F0475846-4FF4-4053-A16A-5651754C44C3}" type="slidenum">
+              <a:rPr lang="en-US" smtClean="0"/>
+              <a:pPr/>
+              <a:t>3</a:t>
+            </a:fld>
+            <a:endParaRPr lang="en-US"/>
+          </a:p>
+        </p:txBody>
+      </p:sp>
+      <p:pic>
+        <p:nvPicPr>
+          <p:cNvPr id="1030" name="Picture 6"/>
+          <p:cNvPicPr>
+            <a:picLocks noGrp="1" noChangeAspect="1" noChangeArrowheads="1"/>
+          </p:cNvPicPr>
+          <p:nvPr>
+            <p:ph idx="1"/>
+          </p:nvPr>
+        </p:nvPicPr>
+        <p:blipFill>
+          <a:blip r:embed="rId2" cstate="print"/>
+          <a:srcRect/>
+          <a:stretch>
+            <a:fillRect/>
+          </a:stretch>
+        </p:blipFill>
+        <p:spPr bwMode="auto">
+          <a:xfrm>
+            <a:off x="1413441" y="1600200"/>
+            <a:ext cx="5749359" cy="3875181"/>
+          </a:xfrm>
+          <a:prstGeom prst="rect">
+            <a:avLst/>
+          </a:prstGeom>
+          <a:noFill/>
+          <a:ln w="9525">
+            <a:noFill/>
+            <a:miter lim="800000"/>
+            <a:headEnd/>
+            <a:tailEnd/>
+          </a:ln>
+        </p:spPr>
+      </p:pic>
+    </p:spTree>
+  </p:cSld>
+  <p:clrMapOvr>
+    <a:masterClrMapping/>
+  </p:clrMapOvr>
+</p:sld>
+</file>
+
+<file path=ppt/slides/slide4.xml><?xml version="1.0" encoding="utf-8"?>
+<p:sld xmlns:a="http://schemas.openxmlformats.org/drawingml/2006/main" xmlns:r="http://schemas.openxmlformats.org/officeDocument/2006/relationships" xmlns:p="http://schemas.openxmlformats.org/presentationml/2006/main">
+  <p:cSld>
+    <p:spTree>
+      <p:nvGrpSpPr>
+        <p:cNvPr id="1" name=""/>
+        <p:cNvGrpSpPr/>
+        <p:nvPr/>
+      </p:nvGrpSpPr>
+      <p:grpSpPr>
+        <a:xfrm>
+          <a:off x="0" y="0"/>
+          <a:ext cx="0" cy="0"/>
+          <a:chOff x="0" y="0"/>
+          <a:chExt cx="0" cy="0"/>
+        </a:xfrm>
+      </p:grpSpPr>
+      <p:sp>
+        <p:nvSpPr>
+          <p:cNvPr id="2" name="Title 1"/>
+          <p:cNvSpPr>
+            <a:spLocks noGrp="1"/>
+          </p:cNvSpPr>
+          <p:nvPr>
+            <p:ph type="title"/>
+          </p:nvPr>
+        </p:nvSpPr>
+        <p:spPr/>
+        <p:txBody>
+          <a:bodyPr/>
+          <a:lstStyle/>
+          <a:p>
+            <a:r>
+              <a:rPr lang="en-US" dirty="0" smtClean="0"/>
+              <a:t>Layout Terms</a:t>
+            </a:r>
+            <a:endParaRPr lang="en-US" dirty="0"/>
+          </a:p>
+        </p:txBody>
+      </p:sp>
+      <p:sp>
+        <p:nvSpPr>
+          <p:cNvPr id="3" name="Content Placeholder 2"/>
+          <p:cNvSpPr>
+            <a:spLocks noGrp="1"/>
+          </p:cNvSpPr>
+          <p:nvPr>
+            <p:ph idx="1"/>
+          </p:nvPr>
+        </p:nvSpPr>
+        <p:spPr/>
+        <p:txBody>
+          <a:bodyPr/>
+          <a:lstStyle/>
+          <a:p>
+            <a:r>
+              <a:rPr lang="en-US" dirty="0" smtClean="0"/>
+              <a:t>Positioning</a:t>
+            </a:r>
+          </a:p>
+          <a:p>
+            <a:pPr lvl="1"/>
+            <a:r>
+              <a:rPr lang="en-US" dirty="0" smtClean="0">
+                <a:latin typeface="Courier New" pitchFamily="49" charset="0"/>
+                <a:cs typeface="Courier New" pitchFamily="49" charset="0"/>
+              </a:rPr>
+              <a:t>p</a:t>
+            </a:r>
+            <a:r>
+              <a:rPr lang="en-US" dirty="0" smtClean="0">
+                <a:latin typeface="Courier New" pitchFamily="49" charset="0"/>
+                <a:cs typeface="Courier New" pitchFamily="49" charset="0"/>
+              </a:rPr>
+              <a:t>osition: absolute;</a:t>
+            </a:r>
+          </a:p>
+          <a:p>
+            <a:pPr lvl="1"/>
+            <a:r>
+              <a:rPr lang="en-US" dirty="0" smtClean="0">
+                <a:latin typeface="Courier New" pitchFamily="49" charset="0"/>
+                <a:cs typeface="Courier New" pitchFamily="49" charset="0"/>
+              </a:rPr>
+              <a:t>p</a:t>
+            </a:r>
+            <a:r>
+              <a:rPr lang="en-US" dirty="0" smtClean="0">
+                <a:latin typeface="Courier New" pitchFamily="49" charset="0"/>
+                <a:cs typeface="Courier New" pitchFamily="49" charset="0"/>
+              </a:rPr>
+              <a:t>osition: relative;</a:t>
+            </a:r>
+          </a:p>
+          <a:p>
+            <a:pPr lvl="1"/>
+            <a:r>
+              <a:rPr lang="en-US" dirty="0" smtClean="0">
+                <a:latin typeface="Courier New" pitchFamily="49" charset="0"/>
+                <a:cs typeface="Courier New" pitchFamily="49" charset="0"/>
+              </a:rPr>
+              <a:t>f</a:t>
+            </a:r>
+            <a:r>
+              <a:rPr lang="en-US" dirty="0" smtClean="0">
+                <a:latin typeface="Courier New" pitchFamily="49" charset="0"/>
+                <a:cs typeface="Courier New" pitchFamily="49" charset="0"/>
+              </a:rPr>
+              <a:t>ixed, static and inherit</a:t>
+            </a:r>
+          </a:p>
+          <a:p>
+            <a:r>
+              <a:rPr lang="en-US" dirty="0" smtClean="0">
+                <a:latin typeface="+mj-lt"/>
+                <a:cs typeface="Courier New" pitchFamily="49" charset="0"/>
+              </a:rPr>
+              <a:t>Absolute is from the top right of the viewport</a:t>
+            </a:r>
+          </a:p>
+          <a:p>
+            <a:r>
+              <a:rPr lang="en-US" dirty="0" smtClean="0">
+                <a:latin typeface="+mj-lt"/>
+                <a:cs typeface="Courier New" pitchFamily="49" charset="0"/>
+              </a:rPr>
+              <a:t>Relative is in relation to it’s original position in the normal flow</a:t>
+            </a:r>
+          </a:p>
+          <a:p>
+            <a:r>
+              <a:rPr lang="en-US" dirty="0" smtClean="0">
+                <a:latin typeface="+mj-lt"/>
+                <a:cs typeface="Courier New" pitchFamily="49" charset="0"/>
+              </a:rPr>
+              <a:t>Let’s see the demo</a:t>
+            </a:r>
+          </a:p>
+        </p:txBody>
+      </p:sp>
+      <p:sp>
+        <p:nvSpPr>
+          <p:cNvPr id="4" name="Slide Number Placeholder 3"/>
+          <p:cNvSpPr>
+            <a:spLocks noGrp="1"/>
+          </p:cNvSpPr>
+          <p:nvPr>
+            <p:ph type="sldNum" sz="quarter" idx="12"/>
+          </p:nvPr>
+        </p:nvSpPr>
+        <p:spPr/>
+        <p:txBody>
+          <a:bodyPr/>
+          <a:lstStyle/>
+          <a:p>
+            <a:fld id="{F0475846-4FF4-4053-A16A-5651754C44C3}" type="slidenum">
+              <a:rPr lang="en-US" smtClean="0"/>
+              <a:pPr/>
+              <a:t>4</a:t>
+            </a:fld>
+            <a:endParaRPr lang="en-US"/>
+          </a:p>
+        </p:txBody>
+      </p:sp>
+    </p:spTree>
+  </p:cSld>
+  <p:clrMapOvr>
+    <a:masterClrMapping/>
+  </p:clrMapOvr>
+</p:sld>
+</file>
+
+<file path=ppt/slides/slide5.xml><?xml version="1.0" encoding="utf-8"?>
+<p:sld xmlns:a="http://schemas.openxmlformats.org/drawingml/2006/main" xmlns:r="http://schemas.openxmlformats.org/officeDocument/2006/relationships" xmlns:p="http://schemas.openxmlformats.org/presentationml/2006/main">
+  <p:cSld>
+    <p:spTree>
+      <p:nvGrpSpPr>
+        <p:cNvPr id="1" name=""/>
+        <p:cNvGrpSpPr/>
+        <p:nvPr/>
+      </p:nvGrpSpPr>
+      <p:grpSpPr>
+        <a:xfrm>
+          <a:off x="0" y="0"/>
+          <a:ext cx="0" cy="0"/>
+          <a:chOff x="0" y="0"/>
+          <a:chExt cx="0" cy="0"/>
+        </a:xfrm>
+      </p:grpSpPr>
+      <p:sp>
+        <p:nvSpPr>
+          <p:cNvPr id="2" name="Title 1"/>
+          <p:cNvSpPr>
+            <a:spLocks noGrp="1"/>
+          </p:cNvSpPr>
+          <p:nvPr>
+            <p:ph type="title"/>
+          </p:nvPr>
+        </p:nvSpPr>
+        <p:spPr/>
+        <p:txBody>
+          <a:bodyPr/>
+          <a:lstStyle/>
+          <a:p>
+            <a:r>
+              <a:rPr lang="en-US" dirty="0" smtClean="0"/>
+              <a:t>More layout terms</a:t>
+            </a:r>
+            <a:endParaRPr lang="en-US" dirty="0"/>
+          </a:p>
+        </p:txBody>
+      </p:sp>
+      <p:sp>
+        <p:nvSpPr>
+          <p:cNvPr id="3" name="Content Placeholder 2"/>
+          <p:cNvSpPr>
+            <a:spLocks noGrp="1"/>
+          </p:cNvSpPr>
+          <p:nvPr>
+            <p:ph idx="1"/>
+          </p:nvPr>
+        </p:nvSpPr>
+        <p:spPr/>
+        <p:txBody>
+          <a:bodyPr>
+            <a:normAutofit lnSpcReduction="10000"/>
+          </a:bodyPr>
+          <a:lstStyle/>
+          <a:p>
+            <a:r>
+              <a:rPr lang="en-US" dirty="0" smtClean="0"/>
+              <a:t>d</a:t>
+            </a:r>
+            <a:r>
+              <a:rPr lang="en-US" dirty="0" smtClean="0"/>
+              <a:t>isplay: block – requires a new line</a:t>
+            </a:r>
+          </a:p>
+          <a:p>
+            <a:pPr lvl="1"/>
+            <a:r>
+              <a:rPr lang="en-US" dirty="0" smtClean="0"/>
+              <a:t>Cannot have items to it’s left of right</a:t>
+            </a:r>
+          </a:p>
+          <a:p>
+            <a:r>
+              <a:rPr lang="en-US" dirty="0" smtClean="0"/>
+              <a:t>d</a:t>
+            </a:r>
+            <a:r>
+              <a:rPr lang="en-US" dirty="0" smtClean="0"/>
+              <a:t>isplay: inline – displays content </a:t>
+            </a:r>
+            <a:r>
+              <a:rPr lang="en-US" dirty="0" err="1" smtClean="0"/>
+              <a:t>sidexside</a:t>
+            </a:r>
+            <a:endParaRPr lang="en-US" dirty="0" smtClean="0"/>
+          </a:p>
+          <a:p>
+            <a:pPr lvl="1"/>
+            <a:r>
+              <a:rPr lang="en-US" dirty="0" smtClean="0"/>
+              <a:t>Will have items to it’s right</a:t>
+            </a:r>
+          </a:p>
+          <a:p>
+            <a:r>
+              <a:rPr lang="en-US" dirty="0" smtClean="0"/>
+              <a:t>clear – to prevent from floats left or right</a:t>
+            </a:r>
+          </a:p>
+          <a:p>
+            <a:pPr lvl="1"/>
+            <a:r>
+              <a:rPr lang="en-US" dirty="0" smtClean="0"/>
+              <a:t>left, right, both</a:t>
+            </a:r>
+          </a:p>
+          <a:p>
+            <a:r>
+              <a:rPr lang="en-US" dirty="0" smtClean="0"/>
+              <a:t>o</a:t>
+            </a:r>
+            <a:r>
+              <a:rPr lang="en-US" dirty="0" smtClean="0"/>
+              <a:t>verflow</a:t>
+            </a:r>
+          </a:p>
+          <a:p>
+            <a:pPr lvl="1"/>
+            <a:r>
+              <a:rPr lang="en-US" dirty="0" smtClean="0"/>
+              <a:t>visible, hidden, scroll,  auto</a:t>
+            </a:r>
+          </a:p>
+          <a:p>
+            <a:r>
+              <a:rPr lang="en-US" dirty="0" smtClean="0"/>
+              <a:t>Let’s see the demo</a:t>
+            </a:r>
+          </a:p>
+          <a:p>
+            <a:pPr lvl="1"/>
+            <a:endParaRPr lang="en-US" dirty="0" smtClean="0"/>
+          </a:p>
+          <a:p>
+            <a:pPr lvl="1"/>
+            <a:endParaRPr lang="en-US" dirty="0"/>
+          </a:p>
+        </p:txBody>
+      </p:sp>
+      <p:sp>
+        <p:nvSpPr>
+          <p:cNvPr id="4" name="Slide Number Placeholder 3"/>
+          <p:cNvSpPr>
+            <a:spLocks noGrp="1"/>
+          </p:cNvSpPr>
+          <p:nvPr>
+            <p:ph type="sldNum" sz="quarter" idx="12"/>
+          </p:nvPr>
+        </p:nvSpPr>
+        <p:spPr/>
+        <p:txBody>
+          <a:bodyPr/>
+          <a:lstStyle/>
+          <a:p>
+            <a:fld id="{F0475846-4FF4-4053-A16A-5651754C44C3}" type="slidenum">
+              <a:rPr lang="en-US" smtClean="0"/>
+              <a:pPr/>
+              <a:t>5</a:t>
+            </a:fld>
+            <a:endParaRPr lang="en-US"/>
+          </a:p>
+        </p:txBody>
+      </p:sp>
+    </p:spTree>
+  </p:cSld>
+  <p:clrMapOvr>
+    <a:masterClrMapping/>
+  </p:clrMapOvr>
+</p:sld>
+</file>
+
+<file path=ppt/slides/slide6.xml><?xml version="1.0" encoding="utf-8"?>
+<p:sld xmlns:a="http://schemas.openxmlformats.org/drawingml/2006/main" xmlns:r="http://schemas.openxmlformats.org/officeDocument/2006/relationships" xmlns:p="http://schemas.openxmlformats.org/presentationml/2006/main">
+  <p:cSld>
+    <p:spTree>
+      <p:nvGrpSpPr>
+        <p:cNvPr id="1" name=""/>
+        <p:cNvGrpSpPr/>
+        <p:nvPr/>
+      </p:nvGrpSpPr>
+      <p:grpSpPr>
+        <a:xfrm>
+          <a:off x="0" y="0"/>
+          <a:ext cx="0" cy="0"/>
+          <a:chOff x="0" y="0"/>
+          <a:chExt cx="0" cy="0"/>
+        </a:xfrm>
+      </p:grpSpPr>
+      <p:sp>
+        <p:nvSpPr>
+          <p:cNvPr id="2" name="Title 1"/>
+          <p:cNvSpPr>
+            <a:spLocks noGrp="1"/>
+          </p:cNvSpPr>
+          <p:nvPr>
+            <p:ph type="title"/>
+          </p:nvPr>
+        </p:nvSpPr>
+        <p:spPr/>
+        <p:txBody>
+          <a:bodyPr/>
+          <a:lstStyle/>
+          <a:p>
+            <a:r>
+              <a:rPr lang="en-US" dirty="0" smtClean="0"/>
+              <a:t>More Layout Terms</a:t>
+            </a:r>
+            <a:endParaRPr lang="en-US" dirty="0"/>
+          </a:p>
+        </p:txBody>
+      </p:sp>
+      <p:sp>
+        <p:nvSpPr>
+          <p:cNvPr id="3" name="Content Placeholder 2"/>
+          <p:cNvSpPr>
+            <a:spLocks noGrp="1"/>
+          </p:cNvSpPr>
+          <p:nvPr>
+            <p:ph idx="1"/>
+          </p:nvPr>
+        </p:nvSpPr>
+        <p:spPr/>
+        <p:txBody>
+          <a:bodyPr/>
+          <a:lstStyle/>
+          <a:p>
+            <a:r>
+              <a:rPr lang="en-US" dirty="0" smtClean="0"/>
+              <a:t>width</a:t>
+            </a:r>
+          </a:p>
+          <a:p>
+            <a:r>
+              <a:rPr lang="en-US" dirty="0" smtClean="0"/>
+              <a:t>h</a:t>
+            </a:r>
+            <a:r>
+              <a:rPr lang="en-US" dirty="0" smtClean="0"/>
+              <a:t>eight</a:t>
+            </a:r>
+          </a:p>
+          <a:p>
+            <a:r>
+              <a:rPr lang="en-US" dirty="0" smtClean="0"/>
+              <a:t>Can be in </a:t>
+            </a:r>
+            <a:r>
+              <a:rPr lang="en-US" dirty="0" err="1" smtClean="0"/>
+              <a:t>px</a:t>
+            </a:r>
+            <a:r>
+              <a:rPr lang="en-US" dirty="0" smtClean="0"/>
+              <a:t> or percentages</a:t>
+            </a:r>
+          </a:p>
+          <a:p>
+            <a:pPr lvl="1"/>
+            <a:r>
+              <a:rPr lang="en-US" dirty="0" smtClean="0"/>
+              <a:t>w</a:t>
+            </a:r>
+            <a:r>
+              <a:rPr lang="en-US" dirty="0" smtClean="0"/>
+              <a:t>idth: 300px or width: 90%;</a:t>
+            </a:r>
+          </a:p>
+          <a:p>
+            <a:r>
+              <a:rPr lang="en-US" dirty="0" smtClean="0"/>
+              <a:t>max-height: 300px;</a:t>
+            </a:r>
+          </a:p>
+          <a:p>
+            <a:r>
+              <a:rPr lang="en-US" dirty="0" smtClean="0"/>
+              <a:t>min-height: 500px;</a:t>
+            </a:r>
+            <a:endParaRPr lang="en-US" dirty="0"/>
+          </a:p>
+        </p:txBody>
+      </p:sp>
+      <p:sp>
+        <p:nvSpPr>
+          <p:cNvPr id="4" name="Slide Number Placeholder 3"/>
+          <p:cNvSpPr>
+            <a:spLocks noGrp="1"/>
+          </p:cNvSpPr>
+          <p:nvPr>
+            <p:ph type="sldNum" sz="quarter" idx="12"/>
+          </p:nvPr>
+        </p:nvSpPr>
+        <p:spPr/>
+        <p:txBody>
+          <a:bodyPr/>
+          <a:lstStyle/>
+          <a:p>
+            <a:fld id="{F0475846-4FF4-4053-A16A-5651754C44C3}" type="slidenum">
+              <a:rPr lang="en-US" smtClean="0"/>
+              <a:pPr/>
+              <a:t>6</a:t>
+            </a:fld>
+            <a:endParaRPr lang="en-US"/>
+          </a:p>
+        </p:txBody>
+      </p:sp>
+    </p:spTree>
+  </p:cSld>
+  <p:clrMapOvr>
+    <a:masterClrMapping/>
+  </p:clrMapOvr>
+</p:sld>
+</file>
+
+<file path=ppt/slides/slide7.xml><?xml version="1.0" encoding="utf-8"?>
+<p:sld xmlns:a="http://schemas.openxmlformats.org/drawingml/2006/main" xmlns:r="http://schemas.openxmlformats.org/officeDocument/2006/relationships" xmlns:p="http://schemas.openxmlformats.org/presentationml/2006/main">
+  <p:cSld>
+    <p:spTree>
+      <p:nvGrpSpPr>
+        <p:cNvPr id="1" name=""/>
+        <p:cNvGrpSpPr/>
+        <p:nvPr/>
+      </p:nvGrpSpPr>
+      <p:grpSpPr>
+        <a:xfrm>
+          <a:off x="0" y="0"/>
+          <a:ext cx="0" cy="0"/>
+          <a:chOff x="0" y="0"/>
+          <a:chExt cx="0" cy="0"/>
+        </a:xfrm>
+      </p:grpSpPr>
+      <p:sp>
+        <p:nvSpPr>
+          <p:cNvPr id="2" name="Title 1"/>
+          <p:cNvSpPr>
+            <a:spLocks noGrp="1"/>
+          </p:cNvSpPr>
+          <p:nvPr>
+            <p:ph type="title"/>
+          </p:nvPr>
+        </p:nvSpPr>
+        <p:spPr/>
+        <p:txBody>
+          <a:bodyPr/>
+          <a:lstStyle/>
+          <a:p>
+            <a:r>
+              <a:rPr lang="en-US" dirty="0" smtClean="0"/>
+              <a:t>Background Images</a:t>
+            </a:r>
+            <a:endParaRPr lang="en-US" dirty="0"/>
+          </a:p>
+        </p:txBody>
+      </p:sp>
+      <p:sp>
+        <p:nvSpPr>
+          <p:cNvPr id="3" name="Content Placeholder 2"/>
+          <p:cNvSpPr>
+            <a:spLocks noGrp="1"/>
+          </p:cNvSpPr>
+          <p:nvPr>
+            <p:ph idx="1"/>
+          </p:nvPr>
+        </p:nvSpPr>
+        <p:spPr/>
+        <p:txBody>
           <a:bodyPr>
             <a:normAutofit/>
           </a:bodyPr>
           <a:lstStyle/>
           <a:p>
             <a:r>
+              <a:rPr lang="en-US" sz="2400" dirty="0" smtClean="0"/>
+              <a:t>background-image: </a:t>
+            </a:r>
+            <a:r>
+              <a:rPr lang="en-US" sz="2400" dirty="0" err="1" smtClean="0"/>
+              <a:t>url</a:t>
+            </a:r>
+            <a:r>
+              <a:rPr lang="en-US" sz="2400" dirty="0" smtClean="0"/>
+              <a:t>(‘path/to/picture.jpg’)</a:t>
+            </a:r>
+          </a:p>
+          <a:p>
+            <a:r>
+              <a:rPr lang="en-US" sz="2400" dirty="0" smtClean="0"/>
+              <a:t>background-repeat: repeat-x;</a:t>
+            </a:r>
+          </a:p>
+          <a:p>
+            <a:r>
+              <a:rPr lang="en-US" sz="2400" dirty="0" smtClean="0"/>
+              <a:t>b</a:t>
+            </a:r>
+            <a:r>
+              <a:rPr lang="en-US" sz="2400" dirty="0" smtClean="0"/>
+              <a:t>ackground-repeat: repeat-y;</a:t>
+            </a:r>
+          </a:p>
+          <a:p>
+            <a:r>
+              <a:rPr lang="en-US" sz="2400" dirty="0" smtClean="0"/>
+              <a:t>b</a:t>
+            </a:r>
+            <a:r>
+              <a:rPr lang="en-US" sz="2400" dirty="0" smtClean="0"/>
+              <a:t>ackground-repeat: no-repeat;</a:t>
+            </a:r>
+          </a:p>
+          <a:p>
+            <a:r>
+              <a:rPr lang="en-US" sz="2400" dirty="0" smtClean="0"/>
+              <a:t>Let’s see the demo</a:t>
+            </a:r>
+            <a:endParaRPr lang="en-US" sz="2400" dirty="0" smtClean="0"/>
+          </a:p>
+        </p:txBody>
+      </p:sp>
+      <p:sp>
+        <p:nvSpPr>
+          <p:cNvPr id="4" name="Slide Number Placeholder 3"/>
+          <p:cNvSpPr>
+            <a:spLocks noGrp="1"/>
+          </p:cNvSpPr>
+          <p:nvPr>
+            <p:ph type="sldNum" sz="quarter" idx="12"/>
+          </p:nvPr>
+        </p:nvSpPr>
+        <p:spPr/>
+        <p:txBody>
+          <a:bodyPr/>
+          <a:lstStyle/>
+          <a:p>
+            <a:fld id="{F0475846-4FF4-4053-A16A-5651754C44C3}" type="slidenum">
+              <a:rPr lang="en-US" smtClean="0"/>
+              <a:pPr/>
+              <a:t>7</a:t>
+            </a:fld>
+            <a:endParaRPr lang="en-US"/>
+          </a:p>
+        </p:txBody>
+      </p:sp>
+    </p:spTree>
+  </p:cSld>
+  <p:clrMapOvr>
+    <a:masterClrMapping/>
+  </p:clrMapOvr>
+</p:sld>
+</file>
+
+<file path=ppt/slides/slide8.xml><?xml version="1.0" encoding="utf-8"?>
+<p:sld xmlns:a="http://schemas.openxmlformats.org/drawingml/2006/main" xmlns:r="http://schemas.openxmlformats.org/officeDocument/2006/relationships" xmlns:p="http://schemas.openxmlformats.org/presentationml/2006/main">
+  <p:cSld>
+    <p:spTree>
+      <p:nvGrpSpPr>
+        <p:cNvPr id="1" name=""/>
+        <p:cNvGrpSpPr/>
+        <p:nvPr/>
+      </p:nvGrpSpPr>
+      <p:grpSpPr>
+        <a:xfrm>
+          <a:off x="0" y="0"/>
+          <a:ext cx="0" cy="0"/>
+          <a:chOff x="0" y="0"/>
+          <a:chExt cx="0" cy="0"/>
+        </a:xfrm>
+      </p:grpSpPr>
+      <p:sp>
+        <p:nvSpPr>
+          <p:cNvPr id="2" name="Title 1"/>
+          <p:cNvSpPr>
+            <a:spLocks noGrp="1"/>
+          </p:cNvSpPr>
+          <p:nvPr>
+            <p:ph type="title"/>
+          </p:nvPr>
+        </p:nvSpPr>
+        <p:spPr/>
+        <p:txBody>
+          <a:bodyPr/>
+          <a:lstStyle/>
+          <a:p>
+            <a:r>
               <a:rPr lang="en-US" dirty="0" smtClean="0"/>
-              <a:t>Resources</a:t>
+              <a:t>Let’s create a simple layout</a:t>
             </a:r>
             <a:endParaRPr lang="en-US" dirty="0"/>
           </a:p>
@@ -4992,12 +5718,95 @@
       </p:sp>
       <p:sp>
         <p:nvSpPr>
-          <p:cNvPr id="3" name="Content Placeholder 2"/>
-          <p:cNvSpPr>
-            <a:spLocks noGrp="1"/>
-          </p:cNvSpPr>
+          <p:cNvPr id="4" name="Slide Number Placeholder 3"/>
+          <p:cNvSpPr>
+            <a:spLocks noGrp="1"/>
+          </p:cNvSpPr>
+          <p:nvPr>
+            <p:ph type="sldNum" sz="quarter" idx="12"/>
+          </p:nvPr>
+        </p:nvSpPr>
+        <p:spPr/>
+        <p:txBody>
+          <a:bodyPr/>
+          <a:lstStyle/>
+          <a:p>
+            <a:fld id="{F0475846-4FF4-4053-A16A-5651754C44C3}" type="slidenum">
+              <a:rPr lang="en-US" smtClean="0"/>
+              <a:pPr/>
+              <a:t>8</a:t>
+            </a:fld>
+            <a:endParaRPr lang="en-US"/>
+          </a:p>
+        </p:txBody>
+      </p:sp>
+      <p:pic>
+        <p:nvPicPr>
+          <p:cNvPr id="2050" name="Picture 2"/>
+          <p:cNvPicPr>
+            <a:picLocks noGrp="1" noChangeAspect="1" noChangeArrowheads="1"/>
+          </p:cNvPicPr>
           <p:nvPr>
             <p:ph idx="1"/>
+          </p:nvPr>
+        </p:nvPicPr>
+        <p:blipFill>
+          <a:blip r:embed="rId2" cstate="print"/>
+          <a:srcRect/>
+          <a:stretch>
+            <a:fillRect/>
+          </a:stretch>
+        </p:blipFill>
+        <p:spPr bwMode="auto">
+          <a:xfrm>
+            <a:off x="1435100" y="1475399"/>
+            <a:ext cx="7499350" cy="4745402"/>
+          </a:xfrm>
+          <a:prstGeom prst="rect">
+            <a:avLst/>
+          </a:prstGeom>
+          <a:noFill/>
+          <a:ln w="9525">
+            <a:noFill/>
+            <a:miter lim="800000"/>
+            <a:headEnd/>
+            <a:tailEnd/>
+          </a:ln>
+        </p:spPr>
+      </p:pic>
+    </p:spTree>
+  </p:cSld>
+  <p:clrMapOvr>
+    <a:masterClrMapping/>
+  </p:clrMapOvr>
+</p:sld>
+</file>
+
+<file path=ppt/slides/slide9.xml><?xml version="1.0" encoding="utf-8"?>
+<p:sld xmlns:a="http://schemas.openxmlformats.org/drawingml/2006/main" xmlns:r="http://schemas.openxmlformats.org/officeDocument/2006/relationships" xmlns:p="http://schemas.openxmlformats.org/presentationml/2006/main">
+  <p:cSld>
+    <p:spTree>
+      <p:nvGrpSpPr>
+        <p:cNvPr id="1" name=""/>
+        <p:cNvGrpSpPr/>
+        <p:nvPr/>
+      </p:nvGrpSpPr>
+      <p:grpSpPr>
+        <a:xfrm>
+          <a:off x="0" y="0"/>
+          <a:ext cx="0" cy="0"/>
+          <a:chOff x="0" y="0"/>
+          <a:chExt cx="0" cy="0"/>
+        </a:xfrm>
+      </p:grpSpPr>
+      <p:sp>
+        <p:nvSpPr>
+          <p:cNvPr id="2" name="Title 1"/>
+          <p:cNvSpPr>
+            <a:spLocks noGrp="1"/>
+          </p:cNvSpPr>
+          <p:nvPr>
+            <p:ph type="title"/>
           </p:nvPr>
         </p:nvSpPr>
         <p:spPr/>
@@ -5008,6 +5817,51 @@
           <a:lstStyle/>
           <a:p>
             <a:r>
+              <a:rPr lang="en-US" dirty="0" smtClean="0"/>
+              <a:t>Resources</a:t>
+            </a:r>
+            <a:endParaRPr lang="en-US" dirty="0"/>
+          </a:p>
+        </p:txBody>
+      </p:sp>
+      <p:sp>
+        <p:nvSpPr>
+          <p:cNvPr id="3" name="Content Placeholder 2"/>
+          <p:cNvSpPr>
+            <a:spLocks noGrp="1"/>
+          </p:cNvSpPr>
+          <p:nvPr>
+            <p:ph idx="1"/>
+          </p:nvPr>
+        </p:nvSpPr>
+        <p:spPr/>
+        <p:txBody>
+          <a:bodyPr>
+            <a:normAutofit/>
+          </a:bodyPr>
+          <a:lstStyle/>
+          <a:p>
+            <a:r>
+              <a:rPr lang="en-US" sz="2400" dirty="0" smtClean="0"/>
+              <a:t>Web </a:t>
+            </a:r>
+            <a:r>
+              <a:rPr lang="en-US" sz="2400" smtClean="0"/>
+              <a:t>Developer Toolbar</a:t>
+            </a:r>
+          </a:p>
+          <a:p>
+            <a:r>
+              <a:rPr lang="en-US" sz="2400" dirty="0" smtClean="0"/>
+              <a:t>https</a:t>
+            </a:r>
+            <a:r>
+              <a:rPr lang="en-US" sz="2400" dirty="0" smtClean="0"/>
+              <a:t>://addons.mozilla.org/en-US/firefox/addon/web-developer/</a:t>
+            </a:r>
+          </a:p>
+          <a:p>
+            <a:r>
               <a:rPr lang="en-US" sz="2400" dirty="0" smtClean="0"/>
               <a:t>Wc3schools </a:t>
             </a:r>
@@ -5088,7 +5942,7 @@
             <a:fld id="{F0475846-4FF4-4053-A16A-5651754C44C3}" type="slidenum">
               <a:rPr lang="en-US" smtClean="0"/>
               <a:pPr/>
-              <a:t>3</a:t>
+              <a:t>9</a:t>
             </a:fld>
             <a:endParaRPr lang="en-US"/>
           </a:p>

</xml_diff>